<commit_message>
updated presentation to include updated visuals and page titles
</commit_message>
<xml_diff>
--- a/Quarantine Survey Analysis.pptx
+++ b/Quarantine Survey Analysis.pptx
@@ -24756,10 +24756,10 @@
       </p:sp>
       <p:pic>
         <p:nvPicPr>
-          <p:cNvPr id="8" name="Picture 7" descr="A close up of a map&#10;&#10;Description automatically generated">
+          <p:cNvPr id="3" name="Picture 2">
             <a:extLst>
               <a:ext uri="{FF2B5EF4-FFF2-40B4-BE49-F238E27FC236}">
-                <a16:creationId xmlns:a16="http://schemas.microsoft.com/office/drawing/2014/main" id="{8A38145A-1563-4E6B-ACD2-F49E5A6A2167}"/>
+                <a16:creationId xmlns:a16="http://schemas.microsoft.com/office/drawing/2014/main" id="{4EB0667B-20F3-4547-BB5F-9F3D4BDAF317}"/>
               </a:ext>
             </a:extLst>
           </p:cNvPr>
@@ -24769,21 +24769,15 @@
           <p:nvPr/>
         </p:nvPicPr>
         <p:blipFill>
-          <a:blip r:embed="rId2">
-            <a:extLst>
-              <a:ext uri="{28A0092B-C50C-407E-A947-70E740481C1C}">
-                <a14:useLocalDpi xmlns:a14="http://schemas.microsoft.com/office/drawing/2010/main" val="0"/>
-              </a:ext>
-            </a:extLst>
-          </a:blip>
+          <a:blip r:embed="rId2"/>
           <a:stretch>
             <a:fillRect/>
           </a:stretch>
         </p:blipFill>
         <p:spPr>
           <a:xfrm>
-            <a:off x="431999" y="909967"/>
-            <a:ext cx="10795633" cy="5516033"/>
+            <a:off x="420000" y="863117"/>
+            <a:ext cx="10844348" cy="5649829"/>
           </a:xfrm>
           <a:prstGeom prst="rect">
             <a:avLst/>
@@ -25786,7 +25780,7 @@
           <a:p>
             <a:r>
               <a:rPr lang="en-US" dirty="0"/>
-              <a:t>High Outlook vs Low Outlook Lifestyles</a:t>
+              <a:t>Outlook Score Outliers - Lifestyle Comparison</a:t>
             </a:r>
           </a:p>
         </p:txBody>

</xml_diff>